<commit_message>
"18-12-2024_tomorrow is presentation date"
</commit_message>
<xml_diff>
--- a/Presentation_fuel_cell_project_khang.pptx
+++ b/Presentation_fuel_cell_project_khang.pptx
@@ -27270,7 +27270,7 @@
           <a:p>
             <a:fld id="{3276D4C3-2FC7-41FD-ADCF-C9AB6471614B}" type="datetimeFigureOut">
               <a:rPr lang="en-US" smtClean="0"/>
-              <a:t>12/11/2024</a:t>
+              <a:t>12/15/2024</a:t>
             </a:fld>
             <a:endParaRPr lang="en-US"/>
           </a:p>
@@ -28219,7 +28219,7 @@
           <a:p>
             <a:fld id="{C8350BE5-A6AC-4165-B247-67A90A80D5E2}" type="datetime1">
               <a:rPr lang="en-US" smtClean="0"/>
-              <a:t>12/11/2024</a:t>
+              <a:t>12/15/2024</a:t>
             </a:fld>
             <a:endParaRPr lang="en-US"/>
           </a:p>
@@ -28420,7 +28420,7 @@
           <a:p>
             <a:fld id="{8F190D30-31F1-43F6-83FB-F1541087453A}" type="datetime1">
               <a:rPr lang="en-US" smtClean="0"/>
-              <a:t>12/11/2024</a:t>
+              <a:t>12/15/2024</a:t>
             </a:fld>
             <a:endParaRPr lang="en-US"/>
           </a:p>
@@ -28631,7 +28631,7 @@
           <a:p>
             <a:fld id="{57EA0E4C-B075-4A07-833D-0D868EF266B8}" type="datetime1">
               <a:rPr lang="en-US" smtClean="0"/>
-              <a:t>12/11/2024</a:t>
+              <a:t>12/15/2024</a:t>
             </a:fld>
             <a:endParaRPr lang="en-US"/>
           </a:p>
@@ -28832,7 +28832,7 @@
           <a:p>
             <a:fld id="{B1926665-A562-482D-B4D9-5A5211AE148E}" type="datetime1">
               <a:rPr lang="en-US" smtClean="0"/>
-              <a:t>12/11/2024</a:t>
+              <a:t>12/15/2024</a:t>
             </a:fld>
             <a:endParaRPr lang="en-US"/>
           </a:p>
@@ -29110,7 +29110,7 @@
           <a:p>
             <a:fld id="{E4FA3EF4-34E2-4996-8118-7B86E22D9396}" type="datetime1">
               <a:rPr lang="en-US" smtClean="0"/>
-              <a:t>12/11/2024</a:t>
+              <a:t>12/15/2024</a:t>
             </a:fld>
             <a:endParaRPr lang="en-US"/>
           </a:p>
@@ -29378,7 +29378,7 @@
           <a:p>
             <a:fld id="{63853019-C7AD-4CA9-99A9-FD7A03D205FC}" type="datetime1">
               <a:rPr lang="en-US" smtClean="0"/>
-              <a:t>12/11/2024</a:t>
+              <a:t>12/15/2024</a:t>
             </a:fld>
             <a:endParaRPr lang="en-US"/>
           </a:p>
@@ -29793,7 +29793,7 @@
           <a:p>
             <a:fld id="{D71785CC-6443-4B32-A8CC-A547552A42E1}" type="datetime1">
               <a:rPr lang="en-US" smtClean="0"/>
-              <a:t>12/11/2024</a:t>
+              <a:t>12/15/2024</a:t>
             </a:fld>
             <a:endParaRPr lang="en-US"/>
           </a:p>
@@ -29937,7 +29937,7 @@
           <a:p>
             <a:fld id="{55BD2296-DC0B-4091-B909-D41774A367E2}" type="datetime1">
               <a:rPr lang="en-US" smtClean="0"/>
-              <a:t>12/11/2024</a:t>
+              <a:t>12/15/2024</a:t>
             </a:fld>
             <a:endParaRPr lang="en-US"/>
           </a:p>
@@ -30053,7 +30053,7 @@
           <a:p>
             <a:fld id="{31413FE0-2FD9-4676-981C-21A8F714C438}" type="datetime1">
               <a:rPr lang="en-US" smtClean="0"/>
-              <a:t>12/11/2024</a:t>
+              <a:t>12/15/2024</a:t>
             </a:fld>
             <a:endParaRPr lang="en-US"/>
           </a:p>
@@ -30367,7 +30367,7 @@
           <a:p>
             <a:fld id="{31A5AB79-1C58-4400-886F-A7D319D64E9F}" type="datetime1">
               <a:rPr lang="en-US" smtClean="0"/>
-              <a:t>12/11/2024</a:t>
+              <a:t>12/15/2024</a:t>
             </a:fld>
             <a:endParaRPr lang="en-US"/>
           </a:p>
@@ -30658,7 +30658,7 @@
           <a:p>
             <a:fld id="{89FB2913-1527-4ACB-BEAD-7F1F463A2AF3}" type="datetime1">
               <a:rPr lang="en-US" smtClean="0"/>
-              <a:t>12/11/2024</a:t>
+              <a:t>12/15/2024</a:t>
             </a:fld>
             <a:endParaRPr lang="en-US"/>
           </a:p>
@@ -30902,7 +30902,7 @@
           <a:p>
             <a:fld id="{5B9A1119-4329-4E49-86E2-47DF2F842EA5}" type="datetime1">
               <a:rPr lang="en-US" smtClean="0"/>
-              <a:t>12/11/2024</a:t>
+              <a:t>12/15/2024</a:t>
             </a:fld>
             <a:endParaRPr lang="en-US"/>
           </a:p>
@@ -33035,8 +33035,8 @@
           </a:p>
         </p:txBody>
       </p:sp>
-      <mc:AlternateContent xmlns:mc="http://schemas.openxmlformats.org/markup-compatibility/2006">
-        <mc:Choice xmlns:a14="http://schemas.microsoft.com/office/drawing/2010/main" Requires="a14">
+      <mc:AlternateContent xmlns:mc="http://schemas.openxmlformats.org/markup-compatibility/2006" xmlns:a14="http://schemas.microsoft.com/office/drawing/2010/main">
+        <mc:Choice Requires="a14">
           <p:sp>
             <p:nvSpPr>
               <p:cNvPr id="10" name="TextBox 9">
@@ -33766,7 +33766,7 @@
             </p:txBody>
           </p:sp>
         </mc:Choice>
-        <mc:Fallback>
+        <mc:Fallback xmlns="">
           <p:sp>
             <p:nvSpPr>
               <p:cNvPr id="10" name="TextBox 9">
@@ -33811,8 +33811,8 @@
           </p:sp>
         </mc:Fallback>
       </mc:AlternateContent>
-      <mc:AlternateContent xmlns:mc="http://schemas.openxmlformats.org/markup-compatibility/2006">
-        <mc:Choice xmlns:a14="http://schemas.microsoft.com/office/drawing/2010/main" Requires="a14">
+      <mc:AlternateContent xmlns:mc="http://schemas.openxmlformats.org/markup-compatibility/2006" xmlns:a14="http://schemas.microsoft.com/office/drawing/2010/main">
+        <mc:Choice Requires="a14">
           <p:sp>
             <p:nvSpPr>
               <p:cNvPr id="12" name="TextBox 11">
@@ -33872,14 +33872,12 @@
                 <a:endParaRPr lang="en-US" dirty="0"/>
               </a:p>
               <a:p>
-                <a:pPr/>
                 <a:r>
                   <a:rPr lang="en-US" dirty="0"/>
                   <a:t>Where:</a:t>
                 </a:r>
               </a:p>
               <a:p>
-                <a:pPr/>
                 <a:r>
                   <a:rPr lang="en-US" dirty="0"/>
                   <a:t>.y: Volume of Hydrogen created, cm</a:t>
@@ -33891,14 +33889,12 @@
                 <a:endParaRPr lang="en-US" dirty="0"/>
               </a:p>
               <a:p>
-                <a:pPr/>
                 <a:r>
                   <a:rPr lang="en-US" dirty="0"/>
                   <a:t>.t: time, s</a:t>
                 </a:r>
               </a:p>
               <a:p>
-                <a:pPr/>
                 <a:r>
                   <a:rPr lang="en-US" dirty="0"/>
                   <a:t>.a: slope of the line</a:t>
@@ -33907,7 +33903,7 @@
             </p:txBody>
           </p:sp>
         </mc:Choice>
-        <mc:Fallback>
+        <mc:Fallback xmlns="">
           <p:sp>
             <p:nvSpPr>
               <p:cNvPr id="12" name="TextBox 11">
@@ -34123,8 +34119,8 @@
           </a:p>
         </p:txBody>
       </p:sp>
-      <mc:AlternateContent xmlns:mc="http://schemas.openxmlformats.org/markup-compatibility/2006">
-        <mc:Choice xmlns:a14="http://schemas.microsoft.com/office/drawing/2010/main" Requires="a14">
+      <mc:AlternateContent xmlns:mc="http://schemas.openxmlformats.org/markup-compatibility/2006" xmlns:a14="http://schemas.microsoft.com/office/drawing/2010/main">
+        <mc:Choice Requires="a14">
           <p:sp>
             <p:nvSpPr>
               <p:cNvPr id="17" name="TextBox 16">
@@ -34338,19 +34334,7 @@
                         <a:rPr lang="en-US" i="0">
                           <a:latin typeface="Cambria Math" panose="02040503050406030204" pitchFamily="18" charset="0"/>
                         </a:rPr>
-                        <m:t>×</m:t>
-                      </m:r>
-                      <m:r>
-                        <a:rPr lang="en-US" i="0">
-                          <a:latin typeface="Cambria Math" panose="02040503050406030204" pitchFamily="18" charset="0"/>
-                        </a:rPr>
-                        <m:t>100</m:t>
-                      </m:r>
-                      <m:r>
-                        <a:rPr lang="en-US" i="0">
-                          <a:latin typeface="Cambria Math" panose="02040503050406030204" pitchFamily="18" charset="0"/>
-                        </a:rPr>
-                        <m:t> </m:t>
+                        <m:t>×100 </m:t>
                       </m:r>
                       <m:d>
                         <m:dPr>
@@ -34375,7 +34359,6 @@
                 <a:endParaRPr lang="en-US" dirty="0"/>
               </a:p>
               <a:p>
-                <a:pPr/>
                 <a:r>
                   <a:rPr lang="en-US" dirty="0"/>
                   <a:t>Where:</a:t>
@@ -34661,7 +34644,7 @@
             </p:txBody>
           </p:sp>
         </mc:Choice>
-        <mc:Fallback>
+        <mc:Fallback xmlns="">
           <p:sp>
             <p:nvSpPr>
               <p:cNvPr id="17" name="TextBox 16">
@@ -34886,8 +34869,8 @@
           </a:xfrm>
         </p:spPr>
       </p:pic>
-      <mc:AlternateContent xmlns:mc="http://schemas.openxmlformats.org/markup-compatibility/2006">
-        <mc:Choice xmlns:a14="http://schemas.microsoft.com/office/drawing/2010/main" Requires="a14">
+      <mc:AlternateContent xmlns:mc="http://schemas.openxmlformats.org/markup-compatibility/2006" xmlns:a14="http://schemas.microsoft.com/office/drawing/2010/main">
+        <mc:Choice Requires="a14">
           <p:sp>
             <p:nvSpPr>
               <p:cNvPr id="15" name="TextBox 14">
@@ -35109,7 +35092,19 @@
                         <a:rPr lang="en-US" i="0">
                           <a:latin typeface="Cambria Math" panose="02040503050406030204" pitchFamily="18" charset="0"/>
                         </a:rPr>
-                        <m:t>×100 </m:t>
+                        <m:t>×</m:t>
+                      </m:r>
+                      <m:r>
+                        <a:rPr lang="en-US" i="0">
+                          <a:latin typeface="Cambria Math" panose="02040503050406030204" pitchFamily="18" charset="0"/>
+                        </a:rPr>
+                        <m:t>100</m:t>
+                      </m:r>
+                      <m:r>
+                        <a:rPr lang="en-US" i="0">
+                          <a:latin typeface="Cambria Math" panose="02040503050406030204" pitchFamily="18" charset="0"/>
+                        </a:rPr>
+                        <m:t> </m:t>
                       </m:r>
                       <m:d>
                         <m:dPr>
@@ -35134,14 +35129,12 @@
                 <a:endParaRPr lang="en-US" dirty="0"/>
               </a:p>
               <a:p>
-                <a:pPr/>
                 <a:r>
                   <a:rPr lang="en-US" dirty="0"/>
                   <a:t>Where: </a:t>
                 </a:r>
               </a:p>
               <a:p>
-                <a:pPr/>
                 <a14:m>
                   <m:oMath xmlns:m="http://schemas.openxmlformats.org/officeDocument/2006/math">
                     <m:r>
@@ -35165,7 +35158,6 @@
                 </a:r>
               </a:p>
               <a:p>
-                <a:pPr/>
                 <a14:m>
                   <m:oMath xmlns:m="http://schemas.openxmlformats.org/officeDocument/2006/math">
                     <m:r>
@@ -35189,7 +35181,6 @@
                 </a:r>
               </a:p>
               <a:p>
-                <a:pPr/>
                 <a14:m>
                   <m:oMath xmlns:m="http://schemas.openxmlformats.org/officeDocument/2006/math">
                     <m:r>
@@ -35226,7 +35217,6 @@
                 </a:endParaRPr>
               </a:p>
               <a:p>
-                <a:pPr/>
                 <a14:m>
                   <m:oMath xmlns:m="http://schemas.openxmlformats.org/officeDocument/2006/math">
                     <m:sSub>
@@ -35418,7 +35408,6 @@
                 </a:r>
               </a:p>
               <a:p>
-                <a:pPr/>
                 <a14:m>
                   <m:oMath xmlns:m="http://schemas.openxmlformats.org/officeDocument/2006/math">
                     <m:sSub>
@@ -35539,7 +35528,7 @@
             </p:txBody>
           </p:sp>
         </mc:Choice>
-        <mc:Fallback>
+        <mc:Fallback xmlns="">
           <p:sp>
             <p:nvSpPr>
               <p:cNvPr id="15" name="TextBox 14">
@@ -35850,7 +35839,10 @@
             </a:r>
           </a:p>
           <a:p>
-            <a:endParaRPr lang="en-US" dirty="0"/>
+            <a:r>
+              <a:rPr lang="en-US" dirty="0"/>
+              <a:t>Fuel cell system explained </a:t>
+            </a:r>
           </a:p>
         </p:txBody>
       </p:sp>
@@ -38209,8 +38201,8 @@
           </p:txBody>
         </p:sp>
       </p:grpSp>
-      <mc:AlternateContent xmlns:mc="http://schemas.openxmlformats.org/markup-compatibility/2006">
-        <mc:Choice xmlns:a14="http://schemas.microsoft.com/office/drawing/2010/main" Requires="a14">
+      <mc:AlternateContent xmlns:mc="http://schemas.openxmlformats.org/markup-compatibility/2006" xmlns:a14="http://schemas.microsoft.com/office/drawing/2010/main">
+        <mc:Choice Requires="a14">
           <p:sp>
             <p:nvSpPr>
               <p:cNvPr id="31" name="TextBox 30">
@@ -38347,7 +38339,7 @@
             </p:txBody>
           </p:sp>
         </mc:Choice>
-        <mc:Fallback>
+        <mc:Fallback xmlns="">
           <p:sp>
             <p:nvSpPr>
               <p:cNvPr id="31" name="TextBox 30">

</xml_diff>